<commit_message>
Add support for reading file property comments
</commit_message>
<xml_diff>
--- a/src/OfficeFileProperties.Tests/SampleFiles/Test.pptx
+++ b/src/OfficeFileProperties.Tests/SampleFiles/Test.pptx
@@ -104,6 +104,11 @@
       </a:defRPr>
     </a:lvl9pPr>
   </p:defaultTextStyle>
+  <p:extLst>
+    <p:ext uri="{EFAFB233-063F-42B5-8137-9DF3F51BA10A}">
+      <p15:sldGuideLst xmlns:p15="http://schemas.microsoft.com/office/powerpoint/2012/main"/>
+    </p:ext>
+  </p:extLst>
 </p:presentation>
 </file>
 
@@ -149,10 +154,9 @@
           </a:lstStyle>
           <a:p>
             <a:r>
-              <a:rPr lang="en-US" smtClean="0"/>
+              <a:rPr lang="en-US"/>
               <a:t>Click to edit Master title style</a:t>
             </a:r>
-            <a:endParaRPr lang="en-US"/>
           </a:p>
         </p:txBody>
       </p:sp>
@@ -214,10 +218,9 @@
           </a:lstStyle>
           <a:p>
             <a:r>
-              <a:rPr lang="en-US" smtClean="0"/>
+              <a:rPr lang="en-US"/>
               <a:t>Click to edit Master subtitle style</a:t>
             </a:r>
-            <a:endParaRPr lang="en-US"/>
           </a:p>
         </p:txBody>
       </p:sp>
@@ -238,7 +241,7 @@
           <a:p>
             <a:fld id="{0B36BE16-BFDF-4E4A-83B4-794D0512D4FC}" type="datetimeFigureOut">
               <a:rPr lang="en-US" smtClean="0"/>
-              <a:t>2/29/2016</a:t>
+              <a:t>9/21/2018</a:t>
             </a:fld>
             <a:endParaRPr lang="en-US"/>
           </a:p>
@@ -332,10 +335,9 @@
           <a:lstStyle/>
           <a:p>
             <a:r>
-              <a:rPr lang="en-US" smtClean="0"/>
+              <a:rPr lang="en-US"/>
               <a:t>Click to edit Master title style</a:t>
             </a:r>
-            <a:endParaRPr lang="en-US"/>
           </a:p>
         </p:txBody>
       </p:sp>
@@ -356,38 +358,37 @@
           <a:p>
             <a:pPr lvl="0"/>
             <a:r>
-              <a:rPr lang="en-US" smtClean="0"/>
+              <a:rPr lang="en-US"/>
               <a:t>Click to edit Master text styles</a:t>
             </a:r>
           </a:p>
           <a:p>
             <a:pPr lvl="1"/>
             <a:r>
-              <a:rPr lang="en-US" smtClean="0"/>
+              <a:rPr lang="en-US"/>
               <a:t>Second level</a:t>
             </a:r>
           </a:p>
           <a:p>
             <a:pPr lvl="2"/>
             <a:r>
-              <a:rPr lang="en-US" smtClean="0"/>
+              <a:rPr lang="en-US"/>
               <a:t>Third level</a:t>
             </a:r>
           </a:p>
           <a:p>
             <a:pPr lvl="3"/>
             <a:r>
-              <a:rPr lang="en-US" smtClean="0"/>
+              <a:rPr lang="en-US"/>
               <a:t>Fourth level</a:t>
             </a:r>
           </a:p>
           <a:p>
             <a:pPr lvl="4"/>
             <a:r>
-              <a:rPr lang="en-US" smtClean="0"/>
+              <a:rPr lang="en-US"/>
               <a:t>Fifth level</a:t>
             </a:r>
-            <a:endParaRPr lang="en-US"/>
           </a:p>
         </p:txBody>
       </p:sp>
@@ -408,7 +409,7 @@
           <a:p>
             <a:fld id="{0B36BE16-BFDF-4E4A-83B4-794D0512D4FC}" type="datetimeFigureOut">
               <a:rPr lang="en-US" smtClean="0"/>
-              <a:t>2/29/2016</a:t>
+              <a:t>9/21/2018</a:t>
             </a:fld>
             <a:endParaRPr lang="en-US"/>
           </a:p>
@@ -507,10 +508,9 @@
           <a:lstStyle/>
           <a:p>
             <a:r>
-              <a:rPr lang="en-US" smtClean="0"/>
+              <a:rPr lang="en-US"/>
               <a:t>Click to edit Master title style</a:t>
             </a:r>
-            <a:endParaRPr lang="en-US"/>
           </a:p>
         </p:txBody>
       </p:sp>
@@ -536,38 +536,37 @@
           <a:p>
             <a:pPr lvl="0"/>
             <a:r>
-              <a:rPr lang="en-US" smtClean="0"/>
+              <a:rPr lang="en-US"/>
               <a:t>Click to edit Master text styles</a:t>
             </a:r>
           </a:p>
           <a:p>
             <a:pPr lvl="1"/>
             <a:r>
-              <a:rPr lang="en-US" smtClean="0"/>
+              <a:rPr lang="en-US"/>
               <a:t>Second level</a:t>
             </a:r>
           </a:p>
           <a:p>
             <a:pPr lvl="2"/>
             <a:r>
-              <a:rPr lang="en-US" smtClean="0"/>
+              <a:rPr lang="en-US"/>
               <a:t>Third level</a:t>
             </a:r>
           </a:p>
           <a:p>
             <a:pPr lvl="3"/>
             <a:r>
-              <a:rPr lang="en-US" smtClean="0"/>
+              <a:rPr lang="en-US"/>
               <a:t>Fourth level</a:t>
             </a:r>
           </a:p>
           <a:p>
             <a:pPr lvl="4"/>
             <a:r>
-              <a:rPr lang="en-US" smtClean="0"/>
+              <a:rPr lang="en-US"/>
               <a:t>Fifth level</a:t>
             </a:r>
-            <a:endParaRPr lang="en-US"/>
           </a:p>
         </p:txBody>
       </p:sp>
@@ -588,7 +587,7 @@
           <a:p>
             <a:fld id="{0B36BE16-BFDF-4E4A-83B4-794D0512D4FC}" type="datetimeFigureOut">
               <a:rPr lang="en-US" smtClean="0"/>
-              <a:t>2/29/2016</a:t>
+              <a:t>9/21/2018</a:t>
             </a:fld>
             <a:endParaRPr lang="en-US"/>
           </a:p>
@@ -682,10 +681,9 @@
           <a:lstStyle/>
           <a:p>
             <a:r>
-              <a:rPr lang="en-US" smtClean="0"/>
+              <a:rPr lang="en-US"/>
               <a:t>Click to edit Master title style</a:t>
             </a:r>
-            <a:endParaRPr lang="en-US"/>
           </a:p>
         </p:txBody>
       </p:sp>
@@ -706,38 +704,37 @@
           <a:p>
             <a:pPr lvl="0"/>
             <a:r>
-              <a:rPr lang="en-US" smtClean="0"/>
+              <a:rPr lang="en-US"/>
               <a:t>Click to edit Master text styles</a:t>
             </a:r>
           </a:p>
           <a:p>
             <a:pPr lvl="1"/>
             <a:r>
-              <a:rPr lang="en-US" smtClean="0"/>
+              <a:rPr lang="en-US"/>
               <a:t>Second level</a:t>
             </a:r>
           </a:p>
           <a:p>
             <a:pPr lvl="2"/>
             <a:r>
-              <a:rPr lang="en-US" smtClean="0"/>
+              <a:rPr lang="en-US"/>
               <a:t>Third level</a:t>
             </a:r>
           </a:p>
           <a:p>
             <a:pPr lvl="3"/>
             <a:r>
-              <a:rPr lang="en-US" smtClean="0"/>
+              <a:rPr lang="en-US"/>
               <a:t>Fourth level</a:t>
             </a:r>
           </a:p>
           <a:p>
             <a:pPr lvl="4"/>
             <a:r>
-              <a:rPr lang="en-US" smtClean="0"/>
+              <a:rPr lang="en-US"/>
               <a:t>Fifth level</a:t>
             </a:r>
-            <a:endParaRPr lang="en-US"/>
           </a:p>
         </p:txBody>
       </p:sp>
@@ -758,7 +755,7 @@
           <a:p>
             <a:fld id="{0B36BE16-BFDF-4E4A-83B4-794D0512D4FC}" type="datetimeFigureOut">
               <a:rPr lang="en-US" smtClean="0"/>
-              <a:t>2/29/2016</a:t>
+              <a:t>9/21/2018</a:t>
             </a:fld>
             <a:endParaRPr lang="en-US"/>
           </a:p>
@@ -861,10 +858,9 @@
           </a:lstStyle>
           <a:p>
             <a:r>
-              <a:rPr lang="en-US" smtClean="0"/>
+              <a:rPr lang="en-US"/>
               <a:t>Click to edit Master title style</a:t>
             </a:r>
-            <a:endParaRPr lang="en-US"/>
           </a:p>
         </p:txBody>
       </p:sp>
@@ -981,7 +977,7 @@
           <a:p>
             <a:pPr lvl="0"/>
             <a:r>
-              <a:rPr lang="en-US" smtClean="0"/>
+              <a:rPr lang="en-US"/>
               <a:t>Click to edit Master text styles</a:t>
             </a:r>
           </a:p>
@@ -1004,7 +1000,7 @@
           <a:p>
             <a:fld id="{0B36BE16-BFDF-4E4A-83B4-794D0512D4FC}" type="datetimeFigureOut">
               <a:rPr lang="en-US" smtClean="0"/>
-              <a:t>2/29/2016</a:t>
+              <a:t>9/21/2018</a:t>
             </a:fld>
             <a:endParaRPr lang="en-US"/>
           </a:p>
@@ -1098,10 +1094,9 @@
           <a:lstStyle/>
           <a:p>
             <a:r>
-              <a:rPr lang="en-US" smtClean="0"/>
+              <a:rPr lang="en-US"/>
               <a:t>Click to edit Master title style</a:t>
             </a:r>
-            <a:endParaRPr lang="en-US"/>
           </a:p>
         </p:txBody>
       </p:sp>
@@ -1127,38 +1122,37 @@
           <a:p>
             <a:pPr lvl="0"/>
             <a:r>
-              <a:rPr lang="en-US" smtClean="0"/>
+              <a:rPr lang="en-US"/>
               <a:t>Click to edit Master text styles</a:t>
             </a:r>
           </a:p>
           <a:p>
             <a:pPr lvl="1"/>
             <a:r>
-              <a:rPr lang="en-US" smtClean="0"/>
+              <a:rPr lang="en-US"/>
               <a:t>Second level</a:t>
             </a:r>
           </a:p>
           <a:p>
             <a:pPr lvl="2"/>
             <a:r>
-              <a:rPr lang="en-US" smtClean="0"/>
+              <a:rPr lang="en-US"/>
               <a:t>Third level</a:t>
             </a:r>
           </a:p>
           <a:p>
             <a:pPr lvl="3"/>
             <a:r>
-              <a:rPr lang="en-US" smtClean="0"/>
+              <a:rPr lang="en-US"/>
               <a:t>Fourth level</a:t>
             </a:r>
           </a:p>
           <a:p>
             <a:pPr lvl="4"/>
             <a:r>
-              <a:rPr lang="en-US" smtClean="0"/>
+              <a:rPr lang="en-US"/>
               <a:t>Fifth level</a:t>
             </a:r>
-            <a:endParaRPr lang="en-US"/>
           </a:p>
         </p:txBody>
       </p:sp>
@@ -1184,38 +1178,37 @@
           <a:p>
             <a:pPr lvl="0"/>
             <a:r>
-              <a:rPr lang="en-US" smtClean="0"/>
+              <a:rPr lang="en-US"/>
               <a:t>Click to edit Master text styles</a:t>
             </a:r>
           </a:p>
           <a:p>
             <a:pPr lvl="1"/>
             <a:r>
-              <a:rPr lang="en-US" smtClean="0"/>
+              <a:rPr lang="en-US"/>
               <a:t>Second level</a:t>
             </a:r>
           </a:p>
           <a:p>
             <a:pPr lvl="2"/>
             <a:r>
-              <a:rPr lang="en-US" smtClean="0"/>
+              <a:rPr lang="en-US"/>
               <a:t>Third level</a:t>
             </a:r>
           </a:p>
           <a:p>
             <a:pPr lvl="3"/>
             <a:r>
-              <a:rPr lang="en-US" smtClean="0"/>
+              <a:rPr lang="en-US"/>
               <a:t>Fourth level</a:t>
             </a:r>
           </a:p>
           <a:p>
             <a:pPr lvl="4"/>
             <a:r>
-              <a:rPr lang="en-US" smtClean="0"/>
+              <a:rPr lang="en-US"/>
               <a:t>Fifth level</a:t>
             </a:r>
-            <a:endParaRPr lang="en-US"/>
           </a:p>
         </p:txBody>
       </p:sp>
@@ -1236,7 +1229,7 @@
           <a:p>
             <a:fld id="{0B36BE16-BFDF-4E4A-83B4-794D0512D4FC}" type="datetimeFigureOut">
               <a:rPr lang="en-US" smtClean="0"/>
-              <a:t>2/29/2016</a:t>
+              <a:t>9/21/2018</a:t>
             </a:fld>
             <a:endParaRPr lang="en-US"/>
           </a:p>
@@ -1335,10 +1328,9 @@
           <a:lstStyle/>
           <a:p>
             <a:r>
-              <a:rPr lang="en-US" smtClean="0"/>
+              <a:rPr lang="en-US"/>
               <a:t>Click to edit Master title style</a:t>
             </a:r>
-            <a:endParaRPr lang="en-US"/>
           </a:p>
         </p:txBody>
       </p:sp>
@@ -1401,7 +1393,7 @@
           <a:p>
             <a:pPr lvl="0"/>
             <a:r>
-              <a:rPr lang="en-US" smtClean="0"/>
+              <a:rPr lang="en-US"/>
               <a:t>Click to edit Master text styles</a:t>
             </a:r>
           </a:p>
@@ -1429,38 +1421,37 @@
           <a:p>
             <a:pPr lvl="0"/>
             <a:r>
-              <a:rPr lang="en-US" smtClean="0"/>
+              <a:rPr lang="en-US"/>
               <a:t>Click to edit Master text styles</a:t>
             </a:r>
           </a:p>
           <a:p>
             <a:pPr lvl="1"/>
             <a:r>
-              <a:rPr lang="en-US" smtClean="0"/>
+              <a:rPr lang="en-US"/>
               <a:t>Second level</a:t>
             </a:r>
           </a:p>
           <a:p>
             <a:pPr lvl="2"/>
             <a:r>
-              <a:rPr lang="en-US" smtClean="0"/>
+              <a:rPr lang="en-US"/>
               <a:t>Third level</a:t>
             </a:r>
           </a:p>
           <a:p>
             <a:pPr lvl="3"/>
             <a:r>
-              <a:rPr lang="en-US" smtClean="0"/>
+              <a:rPr lang="en-US"/>
               <a:t>Fourth level</a:t>
             </a:r>
           </a:p>
           <a:p>
             <a:pPr lvl="4"/>
             <a:r>
-              <a:rPr lang="en-US" smtClean="0"/>
+              <a:rPr lang="en-US"/>
               <a:t>Fifth level</a:t>
             </a:r>
-            <a:endParaRPr lang="en-US"/>
           </a:p>
         </p:txBody>
       </p:sp>
@@ -1523,7 +1514,7 @@
           <a:p>
             <a:pPr lvl="0"/>
             <a:r>
-              <a:rPr lang="en-US" smtClean="0"/>
+              <a:rPr lang="en-US"/>
               <a:t>Click to edit Master text styles</a:t>
             </a:r>
           </a:p>
@@ -1551,38 +1542,37 @@
           <a:p>
             <a:pPr lvl="0"/>
             <a:r>
-              <a:rPr lang="en-US" smtClean="0"/>
+              <a:rPr lang="en-US"/>
               <a:t>Click to edit Master text styles</a:t>
             </a:r>
           </a:p>
           <a:p>
             <a:pPr lvl="1"/>
             <a:r>
-              <a:rPr lang="en-US" smtClean="0"/>
+              <a:rPr lang="en-US"/>
               <a:t>Second level</a:t>
             </a:r>
           </a:p>
           <a:p>
             <a:pPr lvl="2"/>
             <a:r>
-              <a:rPr lang="en-US" smtClean="0"/>
+              <a:rPr lang="en-US"/>
               <a:t>Third level</a:t>
             </a:r>
           </a:p>
           <a:p>
             <a:pPr lvl="3"/>
             <a:r>
-              <a:rPr lang="en-US" smtClean="0"/>
+              <a:rPr lang="en-US"/>
               <a:t>Fourth level</a:t>
             </a:r>
           </a:p>
           <a:p>
             <a:pPr lvl="4"/>
             <a:r>
-              <a:rPr lang="en-US" smtClean="0"/>
+              <a:rPr lang="en-US"/>
               <a:t>Fifth level</a:t>
             </a:r>
-            <a:endParaRPr lang="en-US"/>
           </a:p>
         </p:txBody>
       </p:sp>
@@ -1603,7 +1593,7 @@
           <a:p>
             <a:fld id="{0B36BE16-BFDF-4E4A-83B4-794D0512D4FC}" type="datetimeFigureOut">
               <a:rPr lang="en-US" smtClean="0"/>
-              <a:t>2/29/2016</a:t>
+              <a:t>9/21/2018</a:t>
             </a:fld>
             <a:endParaRPr lang="en-US"/>
           </a:p>
@@ -1697,10 +1687,9 @@
           <a:lstStyle/>
           <a:p>
             <a:r>
-              <a:rPr lang="en-US" smtClean="0"/>
+              <a:rPr lang="en-US"/>
               <a:t>Click to edit Master title style</a:t>
             </a:r>
-            <a:endParaRPr lang="en-US"/>
           </a:p>
         </p:txBody>
       </p:sp>
@@ -1721,7 +1710,7 @@
           <a:p>
             <a:fld id="{0B36BE16-BFDF-4E4A-83B4-794D0512D4FC}" type="datetimeFigureOut">
               <a:rPr lang="en-US" smtClean="0"/>
-              <a:t>2/29/2016</a:t>
+              <a:t>9/21/2018</a:t>
             </a:fld>
             <a:endParaRPr lang="en-US"/>
           </a:p>
@@ -1816,7 +1805,7 @@
           <a:p>
             <a:fld id="{0B36BE16-BFDF-4E4A-83B4-794D0512D4FC}" type="datetimeFigureOut">
               <a:rPr lang="en-US" smtClean="0"/>
-              <a:t>2/29/2016</a:t>
+              <a:t>9/21/2018</a:t>
             </a:fld>
             <a:endParaRPr lang="en-US"/>
           </a:p>
@@ -1919,10 +1908,9 @@
           </a:lstStyle>
           <a:p>
             <a:r>
-              <a:rPr lang="en-US" smtClean="0"/>
+              <a:rPr lang="en-US"/>
               <a:t>Click to edit Master title style</a:t>
             </a:r>
-            <a:endParaRPr lang="en-US"/>
           </a:p>
         </p:txBody>
       </p:sp>
@@ -1976,38 +1964,37 @@
           <a:p>
             <a:pPr lvl="0"/>
             <a:r>
-              <a:rPr lang="en-US" smtClean="0"/>
+              <a:rPr lang="en-US"/>
               <a:t>Click to edit Master text styles</a:t>
             </a:r>
           </a:p>
           <a:p>
             <a:pPr lvl="1"/>
             <a:r>
-              <a:rPr lang="en-US" smtClean="0"/>
+              <a:rPr lang="en-US"/>
               <a:t>Second level</a:t>
             </a:r>
           </a:p>
           <a:p>
             <a:pPr lvl="2"/>
             <a:r>
-              <a:rPr lang="en-US" smtClean="0"/>
+              <a:rPr lang="en-US"/>
               <a:t>Third level</a:t>
             </a:r>
           </a:p>
           <a:p>
             <a:pPr lvl="3"/>
             <a:r>
-              <a:rPr lang="en-US" smtClean="0"/>
+              <a:rPr lang="en-US"/>
               <a:t>Fourth level</a:t>
             </a:r>
           </a:p>
           <a:p>
             <a:pPr lvl="4"/>
             <a:r>
-              <a:rPr lang="en-US" smtClean="0"/>
+              <a:rPr lang="en-US"/>
               <a:t>Fifth level</a:t>
             </a:r>
-            <a:endParaRPr lang="en-US"/>
           </a:p>
         </p:txBody>
       </p:sp>
@@ -2070,7 +2057,7 @@
           <a:p>
             <a:pPr lvl="0"/>
             <a:r>
-              <a:rPr lang="en-US" smtClean="0"/>
+              <a:rPr lang="en-US"/>
               <a:t>Click to edit Master text styles</a:t>
             </a:r>
           </a:p>
@@ -2093,7 +2080,7 @@
           <a:p>
             <a:fld id="{0B36BE16-BFDF-4E4A-83B4-794D0512D4FC}" type="datetimeFigureOut">
               <a:rPr lang="en-US" smtClean="0"/>
-              <a:t>2/29/2016</a:t>
+              <a:t>9/21/2018</a:t>
             </a:fld>
             <a:endParaRPr lang="en-US"/>
           </a:p>
@@ -2196,10 +2183,9 @@
           </a:lstStyle>
           <a:p>
             <a:r>
-              <a:rPr lang="en-US" smtClean="0"/>
+              <a:rPr lang="en-US"/>
               <a:t>Click to edit Master title style</a:t>
             </a:r>
-            <a:endParaRPr lang="en-US"/>
           </a:p>
         </p:txBody>
       </p:sp>
@@ -2323,7 +2309,7 @@
           <a:p>
             <a:pPr lvl="0"/>
             <a:r>
-              <a:rPr lang="en-US" smtClean="0"/>
+              <a:rPr lang="en-US"/>
               <a:t>Click to edit Master text styles</a:t>
             </a:r>
           </a:p>
@@ -2346,7 +2332,7 @@
           <a:p>
             <a:fld id="{0B36BE16-BFDF-4E4A-83B4-794D0512D4FC}" type="datetimeFigureOut">
               <a:rPr lang="en-US" smtClean="0"/>
-              <a:t>2/29/2016</a:t>
+              <a:t>9/21/2018</a:t>
             </a:fld>
             <a:endParaRPr lang="en-US"/>
           </a:p>
@@ -2455,10 +2441,9 @@
           <a:lstStyle/>
           <a:p>
             <a:r>
-              <a:rPr lang="en-US" smtClean="0"/>
+              <a:rPr lang="en-US"/>
               <a:t>Click to edit Master title style</a:t>
             </a:r>
-            <a:endParaRPr lang="en-US"/>
           </a:p>
         </p:txBody>
       </p:sp>
@@ -2489,38 +2474,37 @@
           <a:p>
             <a:pPr lvl="0"/>
             <a:r>
-              <a:rPr lang="en-US" smtClean="0"/>
+              <a:rPr lang="en-US"/>
               <a:t>Click to edit Master text styles</a:t>
             </a:r>
           </a:p>
           <a:p>
             <a:pPr lvl="1"/>
             <a:r>
-              <a:rPr lang="en-US" smtClean="0"/>
+              <a:rPr lang="en-US"/>
               <a:t>Second level</a:t>
             </a:r>
           </a:p>
           <a:p>
             <a:pPr lvl="2"/>
             <a:r>
-              <a:rPr lang="en-US" smtClean="0"/>
+              <a:rPr lang="en-US"/>
               <a:t>Third level</a:t>
             </a:r>
           </a:p>
           <a:p>
             <a:pPr lvl="3"/>
             <a:r>
-              <a:rPr lang="en-US" smtClean="0"/>
+              <a:rPr lang="en-US"/>
               <a:t>Fourth level</a:t>
             </a:r>
           </a:p>
           <a:p>
             <a:pPr lvl="4"/>
             <a:r>
-              <a:rPr lang="en-US" smtClean="0"/>
+              <a:rPr lang="en-US"/>
               <a:t>Fifth level</a:t>
             </a:r>
-            <a:endParaRPr lang="en-US"/>
           </a:p>
         </p:txBody>
       </p:sp>
@@ -2559,7 +2543,7 @@
           <a:p>
             <a:fld id="{0B36BE16-BFDF-4E4A-83B4-794D0512D4FC}" type="datetimeFigureOut">
               <a:rPr lang="en-US" smtClean="0"/>
-              <a:t>2/29/2016</a:t>
+              <a:t>9/21/2018</a:t>
             </a:fld>
             <a:endParaRPr lang="en-US"/>
           </a:p>
@@ -2980,10 +2964,9 @@
           <a:lstStyle/>
           <a:p>
             <a:r>
-              <a:rPr lang="en-US" smtClean="0"/>
+              <a:rPr lang="en-US"/>
               <a:t>Test File</a:t>
             </a:r>
-            <a:endParaRPr lang="en-US"/>
           </a:p>
         </p:txBody>
       </p:sp>

</xml_diff>